<commit_message>
Update 5 - Hospital Data Analysis report - Presentation.pptx
</commit_message>
<xml_diff>
--- a/5 - Hospital Data Analysis report - Presentation.pptx
+++ b/5 - Hospital Data Analysis report - Presentation.pptx
@@ -5,7 +5,7 @@
     <p:sldMasterId id="2432786558" r:id="rId1"/>
   </p:sldMasterIdLst>
   <p:notesMasterIdLst>
-    <p:notesMasterId r:id="rId35"/>
+    <p:notesMasterId r:id="rId36"/>
   </p:notesMasterIdLst>
   <p:sldIdLst>
     <p:sldId id="256" r:id="rId2"/>
@@ -34,13 +34,14 @@
     <p:sldId id="317" r:id="rId25"/>
     <p:sldId id="319" r:id="rId26"/>
     <p:sldId id="318" r:id="rId27"/>
-    <p:sldId id="299" r:id="rId28"/>
-    <p:sldId id="311" r:id="rId29"/>
-    <p:sldId id="312" r:id="rId30"/>
-    <p:sldId id="315" r:id="rId31"/>
-    <p:sldId id="316" r:id="rId32"/>
-    <p:sldId id="272" r:id="rId33"/>
-    <p:sldId id="273" r:id="rId34"/>
+    <p:sldId id="320" r:id="rId28"/>
+    <p:sldId id="299" r:id="rId29"/>
+    <p:sldId id="311" r:id="rId30"/>
+    <p:sldId id="312" r:id="rId31"/>
+    <p:sldId id="315" r:id="rId32"/>
+    <p:sldId id="316" r:id="rId33"/>
+    <p:sldId id="272" r:id="rId34"/>
+    <p:sldId id="273" r:id="rId35"/>
   </p:sldIdLst>
   <p:sldSz cx="9144000" cy="5143500" type="screen16x9"/>
   <p:notesSz cx="6858000" cy="9144000"/>
@@ -14704,8 +14705,8 @@
       </dsp:nvSpPr>
       <dsp:spPr>
         <a:xfrm>
-          <a:off x="684188" y="0"/>
-          <a:ext cx="7934025" cy="4958766"/>
+          <a:off x="608748" y="0"/>
+          <a:ext cx="8081811" cy="5051132"/>
         </a:xfrm>
         <a:prstGeom prst="swooshArrow">
           <a:avLst>
@@ -14747,8 +14748,8 @@
       </dsp:nvSpPr>
       <dsp:spPr>
         <a:xfrm>
-          <a:off x="1069231" y="4135566"/>
-          <a:ext cx="182482" cy="182482"/>
+          <a:off x="1000963" y="4212599"/>
+          <a:ext cx="185881" cy="185881"/>
         </a:xfrm>
         <a:prstGeom prst="ellipse">
           <a:avLst/>
@@ -14796,8 +14797,8 @@
       </dsp:nvSpPr>
       <dsp:spPr>
         <a:xfrm>
-          <a:off x="1213246" y="4066615"/>
-          <a:ext cx="4324100" cy="892150"/>
+          <a:off x="1147661" y="4142364"/>
+          <a:ext cx="4404644" cy="908767"/>
         </a:xfrm>
         <a:prstGeom prst="rect">
           <a:avLst/>
@@ -14821,7 +14822,7 @@
         <a:fontRef idx="minor"/>
       </dsp:style>
       <dsp:txBody>
-        <a:bodyPr spcFirstLastPara="0" vert="horz" wrap="square" lIns="96694" tIns="0" rIns="0" bIns="0" numCol="1" spcCol="1270" anchor="t" anchorCtr="0">
+        <a:bodyPr spcFirstLastPara="0" vert="horz" wrap="square" lIns="98495" tIns="0" rIns="0" bIns="0" numCol="1" spcCol="1270" anchor="t" anchorCtr="0">
           <a:noAutofit/>
         </a:bodyPr>
         <a:lstStyle/>
@@ -14860,8 +14861,8 @@
         </a:p>
       </dsp:txBody>
       <dsp:txXfrm>
-        <a:off x="1213246" y="4066615"/>
-        <a:ext cx="4324100" cy="892150"/>
+        <a:off x="1147661" y="4142364"/>
+        <a:ext cx="4404644" cy="908767"/>
       </dsp:txXfrm>
     </dsp:sp>
     <dsp:sp modelId="{5492C6CC-34F3-46EB-9ACB-8FBAEA9A96DE}">
@@ -14871,8 +14872,8 @@
       </dsp:nvSpPr>
       <dsp:spPr>
         <a:xfrm>
-          <a:off x="1717304" y="3343478"/>
-          <a:ext cx="285624" cy="285624"/>
+          <a:off x="1661107" y="3405756"/>
+          <a:ext cx="290945" cy="290945"/>
         </a:xfrm>
         <a:prstGeom prst="ellipse">
           <a:avLst/>
@@ -14915,8 +14916,8 @@
       </dsp:nvSpPr>
       <dsp:spPr>
         <a:xfrm>
-          <a:off x="2369221" y="3319671"/>
-          <a:ext cx="2786860" cy="1295418"/>
+          <a:off x="2325167" y="3381506"/>
+          <a:ext cx="2838771" cy="1319548"/>
         </a:xfrm>
         <a:prstGeom prst="rect">
           <a:avLst/>
@@ -14940,7 +14941,7 @@
         <a:fontRef idx="minor"/>
       </dsp:style>
       <dsp:txBody>
-        <a:bodyPr spcFirstLastPara="0" vert="horz" wrap="square" lIns="151347" tIns="0" rIns="0" bIns="0" numCol="1" spcCol="1270" anchor="t" anchorCtr="0">
+        <a:bodyPr spcFirstLastPara="0" vert="horz" wrap="square" lIns="154166" tIns="0" rIns="0" bIns="0" numCol="1" spcCol="1270" anchor="t" anchorCtr="0">
           <a:noAutofit/>
         </a:bodyPr>
         <a:lstStyle/>
@@ -14975,8 +14976,8 @@
         </a:p>
       </dsp:txBody>
       <dsp:txXfrm>
-        <a:off x="2369221" y="3319671"/>
-        <a:ext cx="2786860" cy="1295418"/>
+        <a:off x="2325167" y="3381506"/>
+        <a:ext cx="2838771" cy="1319548"/>
       </dsp:txXfrm>
     </dsp:sp>
     <dsp:sp modelId="{1CBC13C1-BE87-40F4-8B48-6B051B2C6CA7}">
@@ -14986,8 +14987,8 @@
       </dsp:nvSpPr>
       <dsp:spPr>
         <a:xfrm>
-          <a:off x="2581399" y="2623398"/>
-          <a:ext cx="380833" cy="380833"/>
+          <a:off x="2541298" y="2672263"/>
+          <a:ext cx="387926" cy="387926"/>
         </a:xfrm>
         <a:prstGeom prst="ellipse">
           <a:avLst/>
@@ -15030,8 +15031,8 @@
       </dsp:nvSpPr>
       <dsp:spPr>
         <a:xfrm>
-          <a:off x="3661522" y="2695416"/>
-          <a:ext cx="3201358" cy="1800234"/>
+          <a:off x="3641540" y="2745624"/>
+          <a:ext cx="3260989" cy="1833766"/>
         </a:xfrm>
         <a:prstGeom prst="rect">
           <a:avLst/>
@@ -15055,7 +15056,7 @@
         <a:fontRef idx="minor"/>
       </dsp:style>
       <dsp:txBody>
-        <a:bodyPr spcFirstLastPara="0" vert="horz" wrap="square" lIns="201796" tIns="0" rIns="0" bIns="0" numCol="1" spcCol="1270" anchor="t" anchorCtr="0">
+        <a:bodyPr spcFirstLastPara="0" vert="horz" wrap="square" lIns="205554" tIns="0" rIns="0" bIns="0" numCol="1" spcCol="1270" anchor="t" anchorCtr="0">
           <a:noAutofit/>
         </a:bodyPr>
         <a:lstStyle/>
@@ -15090,8 +15091,8 @@
         </a:p>
       </dsp:txBody>
       <dsp:txXfrm>
-        <a:off x="3661522" y="2695416"/>
-        <a:ext cx="3201358" cy="1800234"/>
+        <a:off x="3641540" y="2745624"/>
+        <a:ext cx="3260989" cy="1833766"/>
       </dsp:txXfrm>
     </dsp:sp>
     <dsp:sp modelId="{28B63527-204C-4A1A-B91E-54C0C287F97D}">
@@ -15101,8 +15102,8 @@
       </dsp:nvSpPr>
       <dsp:spPr>
         <a:xfrm>
-          <a:off x="3780408" y="1903317"/>
-          <a:ext cx="491909" cy="491909"/>
+          <a:off x="3762641" y="1938770"/>
+          <a:ext cx="501072" cy="501072"/>
         </a:xfrm>
         <a:prstGeom prst="ellipse">
           <a:avLst/>
@@ -15145,8 +15146,8 @@
       </dsp:nvSpPr>
       <dsp:spPr>
         <a:xfrm>
-          <a:off x="4957660" y="2191345"/>
-          <a:ext cx="2675575" cy="2644509"/>
+          <a:off x="4961821" y="2232163"/>
+          <a:ext cx="2725413" cy="2693768"/>
         </a:xfrm>
         <a:prstGeom prst="rect">
           <a:avLst/>
@@ -15170,7 +15171,7 @@
         <a:fontRef idx="minor"/>
       </dsp:style>
       <dsp:txBody>
-        <a:bodyPr spcFirstLastPara="0" vert="horz" wrap="square" lIns="260653" tIns="0" rIns="0" bIns="0" numCol="1" spcCol="1270" anchor="t" anchorCtr="0">
+        <a:bodyPr spcFirstLastPara="0" vert="horz" wrap="square" lIns="265508" tIns="0" rIns="0" bIns="0" numCol="1" spcCol="1270" anchor="t" anchorCtr="0">
           <a:noAutofit/>
         </a:bodyPr>
         <a:lstStyle/>
@@ -15205,8 +15206,8 @@
         </a:p>
       </dsp:txBody>
       <dsp:txXfrm>
-        <a:off x="4957660" y="2191345"/>
-        <a:ext cx="2675575" cy="2644509"/>
+        <a:off x="4961821" y="2232163"/>
+        <a:ext cx="2725413" cy="2693768"/>
       </dsp:txXfrm>
     </dsp:sp>
     <dsp:sp modelId="{D72CFD85-344F-421B-AFE2-5B3480D8A382}">
@@ -15216,8 +15217,8 @@
       </dsp:nvSpPr>
       <dsp:spPr>
         <a:xfrm>
-          <a:off x="5605735" y="1183236"/>
-          <a:ext cx="626788" cy="626788"/>
+          <a:off x="5621967" y="1205276"/>
+          <a:ext cx="638463" cy="638463"/>
         </a:xfrm>
         <a:prstGeom prst="ellipse">
           <a:avLst/>
@@ -15260,8 +15261,8 @@
       </dsp:nvSpPr>
       <dsp:spPr>
         <a:xfrm>
-          <a:off x="6133959" y="3937684"/>
-          <a:ext cx="3407251" cy="877047"/>
+          <a:off x="6160031" y="4011031"/>
+          <a:ext cx="3470717" cy="893384"/>
         </a:xfrm>
         <a:prstGeom prst="rect">
           <a:avLst/>
@@ -15285,7 +15286,7 @@
         <a:fontRef idx="minor"/>
       </dsp:style>
       <dsp:txBody>
-        <a:bodyPr spcFirstLastPara="0" vert="horz" wrap="square" lIns="332122" tIns="0" rIns="0" bIns="0" numCol="1" spcCol="1270" anchor="t" anchorCtr="0">
+        <a:bodyPr spcFirstLastPara="0" vert="horz" wrap="square" lIns="338308" tIns="0" rIns="0" bIns="0" numCol="1" spcCol="1270" anchor="t" anchorCtr="0">
           <a:noAutofit/>
         </a:bodyPr>
         <a:lstStyle/>
@@ -15320,8 +15321,8 @@
         </a:p>
       </dsp:txBody>
       <dsp:txXfrm>
-        <a:off x="6133959" y="3937684"/>
-        <a:ext cx="3407251" cy="877047"/>
+        <a:off x="6160031" y="4011031"/>
+        <a:ext cx="3470717" cy="893384"/>
       </dsp:txXfrm>
     </dsp:sp>
   </dsp:spTree>
@@ -37422,7 +37423,7 @@
           <a:p>
             <a:fld id="{76DF020F-7909-490B-B798-FD6A3ED58930}" type="slidenum">
               <a:rPr lang="en-GB" smtClean="0"/>
-              <a:t>29</a:t>
+              <a:t>30</a:t>
             </a:fld>
             <a:endParaRPr lang="en-GB"/>
           </a:p>
@@ -37513,7 +37514,7 @@
           <a:p>
             <a:fld id="{76DF020F-7909-490B-B798-FD6A3ED58930}" type="slidenum">
               <a:rPr lang="en-GB" smtClean="0"/>
-              <a:t>30</a:t>
+              <a:t>31</a:t>
             </a:fld>
             <a:endParaRPr lang="en-GB"/>
           </a:p>
@@ -37618,7 +37619,7 @@
           <a:p>
             <a:fld id="{76DF020F-7909-490B-B798-FD6A3ED58930}" type="slidenum">
               <a:rPr lang="en-GB" smtClean="0"/>
-              <a:t>31</a:t>
+              <a:t>32</a:t>
             </a:fld>
             <a:endParaRPr lang="en-GB"/>
           </a:p>
@@ -38397,7 +38398,7 @@
           <a:p>
             <a:fld id="{76DF020F-7909-490B-B798-FD6A3ED58930}" type="slidenum">
               <a:rPr lang="en-GB" smtClean="0"/>
-              <a:t>27</a:t>
+              <a:t>28</a:t>
             </a:fld>
             <a:endParaRPr lang="en-GB"/>
           </a:p>
@@ -38488,7 +38489,7 @@
           <a:p>
             <a:fld id="{76DF020F-7909-490B-B798-FD6A3ED58930}" type="slidenum">
               <a:rPr lang="en-GB" smtClean="0"/>
-              <a:t>28</a:t>
+              <a:t>29</a:t>
             </a:fld>
             <a:endParaRPr lang="en-GB"/>
           </a:p>
@@ -44740,7 +44741,13 @@
   <p:cSld>
     <p:spTree>
       <p:nvGrpSpPr>
-        <p:cNvPr id="1" name=""/>
+        <p:cNvPr id="1" name="">
+          <a:extLst>
+            <a:ext uri="{FF2B5EF4-FFF2-40B4-BE49-F238E27FC236}">
+              <a16:creationId xmlns:a16="http://schemas.microsoft.com/office/drawing/2014/main" id="{845EB7AD-4E2D-8BF0-6A95-441FD21058BD}"/>
+            </a:ext>
+          </a:extLst>
+        </p:cNvPr>
         <p:cNvGrpSpPr/>
         <p:nvPr/>
       </p:nvGrpSpPr>
@@ -44757,7 +44764,7 @@
           <p:cNvPr id="5" name="ZoneTexte 4">
             <a:extLst>
               <a:ext uri="{FF2B5EF4-FFF2-40B4-BE49-F238E27FC236}">
-                <a16:creationId xmlns:a16="http://schemas.microsoft.com/office/drawing/2014/main" id="{F322D0EB-FD8E-C3EF-7C5C-6B79FDC0F0A2}"/>
+                <a16:creationId xmlns:a16="http://schemas.microsoft.com/office/drawing/2014/main" id="{BE47A502-00AE-4E6C-E383-2B80E60C5B38}"/>
               </a:ext>
             </a:extLst>
           </p:cNvPr>
@@ -44766,8 +44773,8 @@
         </p:nvSpPr>
         <p:spPr>
           <a:xfrm>
-            <a:off x="302393" y="436047"/>
-            <a:ext cx="5760640" cy="646331"/>
+            <a:off x="1655930" y="2248584"/>
+            <a:ext cx="5832140" cy="646331"/>
           </a:xfrm>
           <a:prstGeom prst="rect">
             <a:avLst/>
@@ -44794,38 +44801,10 @@
           </a:p>
         </p:txBody>
       </p:sp>
-      <p:graphicFrame>
-        <p:nvGraphicFramePr>
-          <p:cNvPr id="2" name="Diagramme 1">
-            <a:extLst>
-              <a:ext uri="{FF2B5EF4-FFF2-40B4-BE49-F238E27FC236}">
-                <a16:creationId xmlns:a16="http://schemas.microsoft.com/office/drawing/2014/main" id="{7842FC18-A843-4522-9C26-B7F611DFE3C8}"/>
-              </a:ext>
-            </a:extLst>
-          </p:cNvPr>
-          <p:cNvGraphicFramePr/>
-          <p:nvPr>
-            <p:extLst>
-              <p:ext uri="{D42A27DB-BD31-4B8C-83A1-F6EECF244321}">
-                <p14:modId xmlns:p14="http://schemas.microsoft.com/office/powerpoint/2010/main" val="1512662540"/>
-              </p:ext>
-            </p:extLst>
-          </p:nvPr>
-        </p:nvGraphicFramePr>
-        <p:xfrm>
-          <a:off x="-601687" y="92367"/>
-          <a:ext cx="9468544" cy="4958766"/>
-        </p:xfrm>
-        <a:graphic>
-          <a:graphicData uri="http://schemas.openxmlformats.org/drawingml/2006/diagram">
-            <dgm:relIds xmlns:dgm="http://schemas.openxmlformats.org/drawingml/2006/diagram" xmlns:r="http://schemas.openxmlformats.org/officeDocument/2006/relationships" r:dm="rId3" r:lo="rId4" r:qs="rId5" r:cs="rId6"/>
-          </a:graphicData>
-        </a:graphic>
-      </p:graphicFrame>
     </p:spTree>
     <p:extLst>
       <p:ext uri="{BB962C8B-B14F-4D97-AF65-F5344CB8AC3E}">
-        <p14:creationId xmlns:p14="http://schemas.microsoft.com/office/powerpoint/2010/main" val="2037100672"/>
+        <p14:creationId xmlns:p14="http://schemas.microsoft.com/office/powerpoint/2010/main" val="3158268625"/>
       </p:ext>
     </p:extLst>
   </p:cSld>
@@ -44907,14 +44886,14 @@
           <p:nvPr>
             <p:extLst>
               <p:ext uri="{D42A27DB-BD31-4B8C-83A1-F6EECF244321}">
-                <p14:modId xmlns:p14="http://schemas.microsoft.com/office/powerpoint/2010/main" val="1656206547"/>
+                <p14:modId xmlns:p14="http://schemas.microsoft.com/office/powerpoint/2010/main" val="4188421069"/>
               </p:ext>
             </p:extLst>
           </p:nvPr>
         </p:nvGraphicFramePr>
         <p:xfrm>
-          <a:off x="-601687" y="92367"/>
-          <a:ext cx="9468544" cy="4958766"/>
+          <a:off x="0" y="1"/>
+          <a:ext cx="9468544" cy="5051132"/>
         </p:xfrm>
         <a:graphic>
           <a:graphicData uri="http://schemas.openxmlformats.org/drawingml/2006/diagram">
@@ -44925,25 +44904,13 @@
     </p:spTree>
     <p:extLst>
       <p:ext uri="{BB962C8B-B14F-4D97-AF65-F5344CB8AC3E}">
-        <p14:creationId xmlns:p14="http://schemas.microsoft.com/office/powerpoint/2010/main" val="4062641543"/>
+        <p14:creationId xmlns:p14="http://schemas.microsoft.com/office/powerpoint/2010/main" val="2037100672"/>
       </p:ext>
     </p:extLst>
   </p:cSld>
   <p:clrMapOvr>
     <a:masterClrMapping/>
   </p:clrMapOvr>
-  <mc:AlternateContent xmlns:mc="http://schemas.openxmlformats.org/markup-compatibility/2006" xmlns:p14="http://schemas.microsoft.com/office/powerpoint/2010/main">
-    <mc:Choice Requires="p14">
-      <p:transition spd="med" p14:dur="700">
-        <p:fade/>
-      </p:transition>
-    </mc:Choice>
-    <mc:Fallback xmlns="">
-      <p:transition spd="med">
-        <p:fade/>
-      </p:transition>
-    </mc:Fallback>
-  </mc:AlternateContent>
 </p:sld>
 </file>
 
@@ -45019,13 +44986,13 @@
           <p:nvPr>
             <p:extLst>
               <p:ext uri="{D42A27DB-BD31-4B8C-83A1-F6EECF244321}">
-                <p14:modId xmlns:p14="http://schemas.microsoft.com/office/powerpoint/2010/main" val="2866928457"/>
+                <p14:modId xmlns:p14="http://schemas.microsoft.com/office/powerpoint/2010/main" val="2765841854"/>
               </p:ext>
             </p:extLst>
           </p:nvPr>
         </p:nvGraphicFramePr>
         <p:xfrm>
-          <a:off x="-601687" y="92367"/>
+          <a:off x="-216024" y="92367"/>
           <a:ext cx="9468544" cy="4958766"/>
         </p:xfrm>
         <a:graphic>
@@ -45037,7 +45004,7 @@
     </p:spTree>
     <p:extLst>
       <p:ext uri="{BB962C8B-B14F-4D97-AF65-F5344CB8AC3E}">
-        <p14:creationId xmlns:p14="http://schemas.microsoft.com/office/powerpoint/2010/main" val="4186024221"/>
+        <p14:creationId xmlns:p14="http://schemas.microsoft.com/office/powerpoint/2010/main" val="4062641543"/>
       </p:ext>
     </p:extLst>
   </p:cSld>
@@ -45231,6 +45198,118 @@
           <p:nvPr>
             <p:extLst>
               <p:ext uri="{D42A27DB-BD31-4B8C-83A1-F6EECF244321}">
+                <p14:modId xmlns:p14="http://schemas.microsoft.com/office/powerpoint/2010/main" val="2866928457"/>
+              </p:ext>
+            </p:extLst>
+          </p:nvPr>
+        </p:nvGraphicFramePr>
+        <p:xfrm>
+          <a:off x="-601687" y="92367"/>
+          <a:ext cx="9468544" cy="4958766"/>
+        </p:xfrm>
+        <a:graphic>
+          <a:graphicData uri="http://schemas.openxmlformats.org/drawingml/2006/diagram">
+            <dgm:relIds xmlns:dgm="http://schemas.openxmlformats.org/drawingml/2006/diagram" xmlns:r="http://schemas.openxmlformats.org/officeDocument/2006/relationships" r:dm="rId3" r:lo="rId4" r:qs="rId5" r:cs="rId6"/>
+          </a:graphicData>
+        </a:graphic>
+      </p:graphicFrame>
+    </p:spTree>
+    <p:extLst>
+      <p:ext uri="{BB962C8B-B14F-4D97-AF65-F5344CB8AC3E}">
+        <p14:creationId xmlns:p14="http://schemas.microsoft.com/office/powerpoint/2010/main" val="4186024221"/>
+      </p:ext>
+    </p:extLst>
+  </p:cSld>
+  <p:clrMapOvr>
+    <a:masterClrMapping/>
+  </p:clrMapOvr>
+  <mc:AlternateContent xmlns:mc="http://schemas.openxmlformats.org/markup-compatibility/2006" xmlns:p14="http://schemas.microsoft.com/office/powerpoint/2010/main">
+    <mc:Choice Requires="p14">
+      <p:transition spd="med" p14:dur="700">
+        <p:fade/>
+      </p:transition>
+    </mc:Choice>
+    <mc:Fallback xmlns="">
+      <p:transition spd="med">
+        <p:fade/>
+      </p:transition>
+    </mc:Fallback>
+  </mc:AlternateContent>
+</p:sld>
+</file>
+
+<file path=ppt/slides/slide31.xml><?xml version="1.0" encoding="utf-8"?>
+<p:sld xmlns:a="http://schemas.openxmlformats.org/drawingml/2006/main" xmlns:r="http://schemas.openxmlformats.org/officeDocument/2006/relationships" xmlns:p="http://schemas.openxmlformats.org/presentationml/2006/main">
+  <p:cSld>
+    <p:spTree>
+      <p:nvGrpSpPr>
+        <p:cNvPr id="1" name=""/>
+        <p:cNvGrpSpPr/>
+        <p:nvPr/>
+      </p:nvGrpSpPr>
+      <p:grpSpPr>
+        <a:xfrm>
+          <a:off x="0" y="0"/>
+          <a:ext cx="0" cy="0"/>
+          <a:chOff x="0" y="0"/>
+          <a:chExt cx="0" cy="0"/>
+        </a:xfrm>
+      </p:grpSpPr>
+      <p:sp>
+        <p:nvSpPr>
+          <p:cNvPr id="5" name="ZoneTexte 4">
+            <a:extLst>
+              <a:ext uri="{FF2B5EF4-FFF2-40B4-BE49-F238E27FC236}">
+                <a16:creationId xmlns:a16="http://schemas.microsoft.com/office/drawing/2014/main" id="{F322D0EB-FD8E-C3EF-7C5C-6B79FDC0F0A2}"/>
+              </a:ext>
+            </a:extLst>
+          </p:cNvPr>
+          <p:cNvSpPr txBox="1"/>
+          <p:nvPr/>
+        </p:nvSpPr>
+        <p:spPr>
+          <a:xfrm>
+            <a:off x="302393" y="436047"/>
+            <a:ext cx="5760640" cy="646331"/>
+          </a:xfrm>
+          <a:prstGeom prst="rect">
+            <a:avLst/>
+          </a:prstGeom>
+          <a:noFill/>
+        </p:spPr>
+        <p:txBody>
+          <a:bodyPr wrap="square">
+            <a:spAutoFit/>
+          </a:bodyPr>
+          <a:lstStyle/>
+          <a:p>
+            <a:r>
+              <a:rPr lang="en-GB" sz="3600" b="1" dirty="0">
+                <a:latin typeface="Times New Roman" panose="02020603050405020304" pitchFamily="18" charset="0"/>
+                <a:cs typeface="Times New Roman" panose="02020603050405020304" pitchFamily="18" charset="0"/>
+              </a:rPr>
+              <a:t>Strategic Recommendations</a:t>
+            </a:r>
+            <a:endParaRPr lang="en-GB" sz="3600" dirty="0">
+              <a:latin typeface="Times New Roman" panose="02020603050405020304" pitchFamily="18" charset="0"/>
+              <a:cs typeface="Times New Roman" panose="02020603050405020304" pitchFamily="18" charset="0"/>
+            </a:endParaRPr>
+          </a:p>
+        </p:txBody>
+      </p:sp>
+      <p:graphicFrame>
+        <p:nvGraphicFramePr>
+          <p:cNvPr id="2" name="Diagramme 1">
+            <a:extLst>
+              <a:ext uri="{FF2B5EF4-FFF2-40B4-BE49-F238E27FC236}">
+                <a16:creationId xmlns:a16="http://schemas.microsoft.com/office/drawing/2014/main" id="{7842FC18-A843-4522-9C26-B7F611DFE3C8}"/>
+              </a:ext>
+            </a:extLst>
+          </p:cNvPr>
+          <p:cNvGraphicFramePr/>
+          <p:nvPr>
+            <p:extLst>
+              <p:ext uri="{D42A27DB-BD31-4B8C-83A1-F6EECF244321}">
                 <p14:modId xmlns:p14="http://schemas.microsoft.com/office/powerpoint/2010/main" val="246564410"/>
               </p:ext>
             </p:extLst>
@@ -45271,7 +45350,7 @@
 </p:sld>
 </file>
 
-<file path=ppt/slides/slide31.xml><?xml version="1.0" encoding="utf-8"?>
+<file path=ppt/slides/slide32.xml><?xml version="1.0" encoding="utf-8"?>
 <p:sld xmlns:a="http://schemas.openxmlformats.org/drawingml/2006/main" xmlns:r="http://schemas.openxmlformats.org/officeDocument/2006/relationships" xmlns:p="http://schemas.openxmlformats.org/presentationml/2006/main">
   <p:cSld>
     <p:spTree>
@@ -45383,7 +45462,7 @@
 </p:sld>
 </file>
 
-<file path=ppt/slides/slide32.xml><?xml version="1.0" encoding="utf-8"?>
+<file path=ppt/slides/slide33.xml><?xml version="1.0" encoding="utf-8"?>
 <p:sld xmlns:a="http://schemas.openxmlformats.org/drawingml/2006/main" xmlns:r="http://schemas.openxmlformats.org/officeDocument/2006/relationships" xmlns:p="http://schemas.openxmlformats.org/presentationml/2006/main">
   <p:cSld>
     <p:spTree>
@@ -45502,7 +45581,7 @@
 </p:sld>
 </file>
 
-<file path=ppt/slides/slide33.xml><?xml version="1.0" encoding="utf-8"?>
+<file path=ppt/slides/slide34.xml><?xml version="1.0" encoding="utf-8"?>
 <p:sld xmlns:a="http://schemas.openxmlformats.org/drawingml/2006/main" xmlns:r="http://schemas.openxmlformats.org/officeDocument/2006/relationships" xmlns:p="http://schemas.openxmlformats.org/presentationml/2006/main">
   <p:cSld>
     <p:spTree>

</xml_diff>